<commit_message>
feat(doc): update DTdemo ppt
</commit_message>
<xml_diff>
--- a/doc/ppt/DTdemo.pptx
+++ b/doc/ppt/DTdemo.pptx
@@ -122,6 +122,7 @@
 <file path=ppt/revisionInfo.xml><?xml version="1.0" encoding="utf-8"?>
 <p1510:revInfo xmlns:a="http://schemas.openxmlformats.org/drawingml/2006/main" xmlns:r="http://schemas.openxmlformats.org/officeDocument/2006/relationships" xmlns:p1510="http://schemas.microsoft.com/office/powerpoint/2015/10/main">
   <p1510:revLst>
+    <p1510:client id="{555669C4-3357-426B-91B7-83E622655BA3}" v="606" dt="2022-11-28T01:27:08.664"/>
     <p1510:client id="{AC1C67B7-90EC-46DE-9AA4-5854C531BC8D}" v="814" dt="2022-11-25T01:07:30.304"/>
   </p1510:revLst>
 </p1510:revInfo>
@@ -274,9 +275,9 @@
           <a:p>
             <a:fld id="{82EDB8D0-98ED-4B86-9D5F-E61ADC70144D}" type="datetimeFigureOut">
               <a:rPr lang="en-US" smtClean="0"/>
-              <a:t>11/24/2022</a:t>
+              <a:t>11/27/2022</a:t>
             </a:fld>
-            <a:endParaRPr lang="en-US" dirty="0"/>
+            <a:endParaRPr lang="en-US"/>
           </a:p>
         </p:txBody>
       </p:sp>
@@ -534,7 +535,7 @@
               <a:tabLst/>
               <a:defRPr/>
             </a:pPr>
-            <a:endParaRPr kumimoji="0" lang="en-US" sz="1800" b="0" i="0" u="none" strike="noStrike" kern="1200" cap="none" spc="0" normalizeH="0" baseline="0" noProof="0" dirty="0">
+            <a:endParaRPr kumimoji="0" lang="en-US" sz="1800" b="0" i="0" u="none" strike="noStrike" kern="1200" cap="none" spc="0" normalizeH="0" baseline="0" noProof="0">
               <a:ln>
                 <a:noFill/>
               </a:ln>
@@ -689,7 +690,7 @@
           <a:p>
             <a:fld id="{82EDB8D0-98ED-4B86-9D5F-E61ADC70144D}" type="datetimeFigureOut">
               <a:rPr lang="en-US" smtClean="0"/>
-              <a:t>11/24/2022</a:t>
+              <a:t>11/27/2022</a:t>
             </a:fld>
             <a:endParaRPr lang="en-US"/>
           </a:p>
@@ -1181,7 +1182,7 @@
           <a:p>
             <a:fld id="{82EDB8D0-98ED-4B86-9D5F-E61ADC70144D}" type="datetimeFigureOut">
               <a:rPr lang="en-US" smtClean="0"/>
-              <a:t>11/24/2022</a:t>
+              <a:t>11/27/2022</a:t>
             </a:fld>
             <a:endParaRPr lang="en-US"/>
           </a:p>
@@ -1668,9 +1669,9 @@
           <a:p>
             <a:fld id="{82EDB8D0-98ED-4B86-9D5F-E61ADC70144D}" type="datetimeFigureOut">
               <a:rPr lang="en-US" smtClean="0"/>
-              <a:t>11/24/2022</a:t>
+              <a:t>11/27/2022</a:t>
             </a:fld>
-            <a:endParaRPr lang="en-US" dirty="0"/>
+            <a:endParaRPr lang="en-US"/>
           </a:p>
         </p:txBody>
       </p:sp>
@@ -2437,7 +2438,7 @@
           <a:p>
             <a:fld id="{82EDB8D0-98ED-4B86-9D5F-E61ADC70144D}" type="datetimeFigureOut">
               <a:rPr lang="en-US" smtClean="0"/>
-              <a:t>11/24/2022</a:t>
+              <a:t>11/27/2022</a:t>
             </a:fld>
             <a:endParaRPr lang="en-US"/>
           </a:p>
@@ -2697,7 +2698,7 @@
               <a:tabLst/>
               <a:defRPr/>
             </a:pPr>
-            <a:endParaRPr kumimoji="0" lang="en-US" sz="1800" b="0" i="0" u="none" strike="noStrike" kern="1200" cap="none" spc="0" normalizeH="0" baseline="0" noProof="0" dirty="0">
+            <a:endParaRPr kumimoji="0" lang="en-US" sz="1800" b="0" i="0" u="none" strike="noStrike" kern="1200" cap="none" spc="0" normalizeH="0" baseline="0" noProof="0">
               <a:ln>
                 <a:noFill/>
               </a:ln>
@@ -2919,7 +2920,7 @@
           <a:p>
             <a:fld id="{82EDB8D0-98ED-4B86-9D5F-E61ADC70144D}" type="datetimeFigureOut">
               <a:rPr lang="en-US" smtClean="0"/>
-              <a:t>11/24/2022</a:t>
+              <a:t>11/27/2022</a:t>
             </a:fld>
             <a:endParaRPr lang="en-US"/>
           </a:p>
@@ -3615,7 +3616,7 @@
           <a:p>
             <a:fld id="{82EDB8D0-98ED-4B86-9D5F-E61ADC70144D}" type="datetimeFigureOut">
               <a:rPr lang="en-US" smtClean="0"/>
-              <a:t>11/24/2022</a:t>
+              <a:t>11/27/2022</a:t>
             </a:fld>
             <a:endParaRPr lang="en-US"/>
           </a:p>
@@ -4040,7 +4041,7 @@
           <a:p>
             <a:fld id="{82EDB8D0-98ED-4B86-9D5F-E61ADC70144D}" type="datetimeFigureOut">
               <a:rPr lang="en-US" smtClean="0"/>
-              <a:t>11/24/2022</a:t>
+              <a:t>11/27/2022</a:t>
             </a:fld>
             <a:endParaRPr lang="en-US"/>
           </a:p>
@@ -4437,7 +4438,7 @@
           <a:p>
             <a:fld id="{82EDB8D0-98ED-4B86-9D5F-E61ADC70144D}" type="datetimeFigureOut">
               <a:rPr lang="en-US" smtClean="0"/>
-              <a:t>11/24/2022</a:t>
+              <a:t>11/27/2022</a:t>
             </a:fld>
             <a:endParaRPr lang="en-US"/>
           </a:p>
@@ -5032,7 +5033,7 @@
           <a:p>
             <a:fld id="{82EDB8D0-98ED-4B86-9D5F-E61ADC70144D}" type="datetimeFigureOut">
               <a:rPr lang="en-US" smtClean="0"/>
-              <a:t>11/24/2022</a:t>
+              <a:t>11/27/2022</a:t>
             </a:fld>
             <a:endParaRPr lang="en-US"/>
           </a:p>
@@ -5607,7 +5608,7 @@
           <a:p>
             <a:fld id="{82EDB8D0-98ED-4B86-9D5F-E61ADC70144D}" type="datetimeFigureOut">
               <a:rPr lang="en-US" smtClean="0"/>
-              <a:t>11/24/2022</a:t>
+              <a:t>11/27/2022</a:t>
             </a:fld>
             <a:endParaRPr lang="en-US"/>
           </a:p>
@@ -6134,9 +6135,9 @@
             <a:fld id="{82EDB8D0-98ED-4B86-9D5F-E61ADC70144D}" type="datetimeFigureOut">
               <a:rPr lang="en-US" smtClean="0"/>
               <a:pPr/>
-              <a:t>11/24/2022</a:t>
+              <a:t>11/27/2022</a:t>
             </a:fld>
-            <a:endParaRPr lang="en-US" dirty="0"/>
+            <a:endParaRPr lang="en-US"/>
           </a:p>
         </p:txBody>
       </p:sp>
@@ -7781,7 +7782,7 @@
               <a:tabLst/>
               <a:defRPr/>
             </a:pPr>
-            <a:endParaRPr kumimoji="0" lang="en-US" sz="1800" b="0" i="0" u="none" strike="noStrike" kern="1200" cap="none" spc="0" normalizeH="0" baseline="0" noProof="0" dirty="0">
+            <a:endParaRPr kumimoji="0" lang="en-US" sz="1800" b="0" i="0" u="none" strike="noStrike" kern="1200" cap="none" spc="0" normalizeH="0" baseline="0" noProof="0">
               <a:ln>
                 <a:noFill/>
               </a:ln>
@@ -7987,7 +7988,7 @@
           <a:lstStyle/>
           <a:p>
             <a:r>
-              <a:rPr lang="en-US" sz="4700" dirty="0" err="1">
+              <a:rPr lang="en-US" sz="4700" err="1">
                 <a:latin typeface="Cambria"/>
                 <a:ea typeface="Cambria"/>
                 <a:cs typeface="Calibri Light"/>
@@ -7995,7 +7996,7 @@
               <a:t>Könnyen</a:t>
             </a:r>
             <a:r>
-              <a:rPr lang="en-US" sz="4700" dirty="0">
+              <a:rPr lang="en-US" sz="4700">
                 <a:latin typeface="Cambria"/>
                 <a:ea typeface="Cambria"/>
                 <a:cs typeface="Calibri Light"/>
@@ -8003,7 +8004,7 @@
               <a:t> </a:t>
             </a:r>
             <a:r>
-              <a:rPr lang="en-US" sz="4700" dirty="0" err="1">
+              <a:rPr lang="en-US" sz="4700" err="1">
                 <a:latin typeface="Cambria"/>
                 <a:ea typeface="Cambria"/>
                 <a:cs typeface="Calibri Light"/>
@@ -8011,7 +8012,7 @@
               <a:t>integrálható</a:t>
             </a:r>
             <a:r>
-              <a:rPr lang="en-US" sz="4700" dirty="0">
+              <a:rPr lang="en-US" sz="4700">
                 <a:latin typeface="Cambria"/>
                 <a:ea typeface="Cambria"/>
                 <a:cs typeface="Calibri Light"/>
@@ -8019,7 +8020,7 @@
               <a:t> URL </a:t>
             </a:r>
             <a:r>
-              <a:rPr lang="en-US" sz="4700" dirty="0" err="1">
+              <a:rPr lang="en-US" sz="4700" err="1">
                 <a:latin typeface="Cambria"/>
                 <a:ea typeface="Cambria"/>
                 <a:cs typeface="Calibri Light"/>
@@ -8027,7 +8028,7 @@
               <a:t>elemző</a:t>
             </a:r>
             <a:r>
-              <a:rPr lang="en-US" sz="4700" dirty="0">
+              <a:rPr lang="en-US" sz="4700">
                 <a:latin typeface="Cambria"/>
                 <a:ea typeface="Cambria"/>
                 <a:cs typeface="Calibri Light"/>
@@ -8035,7 +8036,7 @@
               <a:t> </a:t>
             </a:r>
             <a:r>
-              <a:rPr lang="en-US" sz="4700" dirty="0" err="1">
+              <a:rPr lang="en-US" sz="4700" err="1">
                 <a:latin typeface="Cambria"/>
                 <a:ea typeface="Cambria"/>
                 <a:cs typeface="Calibri Light"/>
@@ -8043,7 +8044,7 @@
               <a:t>alkalmazás</a:t>
             </a:r>
             <a:r>
-              <a:rPr lang="en-US" sz="4700" dirty="0">
+              <a:rPr lang="en-US" sz="4700">
                 <a:latin typeface="Cambria"/>
                 <a:ea typeface="Cambria"/>
                 <a:cs typeface="Calibri Light"/>
@@ -8051,14 +8052,14 @@
               <a:t> </a:t>
             </a:r>
             <a:r>
-              <a:rPr lang="en-US" sz="4700" dirty="0" err="1">
+              <a:rPr lang="en-US" sz="4700" err="1">
                 <a:latin typeface="Cambria"/>
                 <a:ea typeface="Cambria"/>
                 <a:cs typeface="Calibri Light"/>
               </a:rPr>
               <a:t>készítése</a:t>
             </a:r>
-            <a:endParaRPr lang="en-US" sz="4700" dirty="0" err="1">
+            <a:endParaRPr lang="en-US" sz="4700" err="1">
               <a:latin typeface="Cambria"/>
               <a:ea typeface="Cambria"/>
             </a:endParaRPr>
@@ -8117,7 +8118,7 @@
           <a:lstStyle/>
           <a:p>
             <a:r>
-              <a:rPr lang="en-US" dirty="0" err="1"/>
+              <a:rPr lang="en-US" err="1"/>
               <a:t>Bevezető</a:t>
             </a:r>
           </a:p>
@@ -8152,221 +8153,221 @@
           <a:lstStyle/>
           <a:p>
             <a:r>
-              <a:rPr lang="en-US" dirty="0" err="1"/>
+              <a:rPr lang="en-US" err="1"/>
               <a:t>Miért</a:t>
             </a:r>
             <a:r>
-              <a:rPr lang="en-US" dirty="0"/>
+              <a:rPr lang="en-US"/>
               <a:t>?</a:t>
             </a:r>
           </a:p>
           <a:p>
             <a:pPr lvl="1"/>
             <a:r>
-              <a:rPr lang="en-US" dirty="0"/>
+              <a:rPr lang="en-US"/>
               <a:t>Mert </a:t>
             </a:r>
             <a:r>
-              <a:rPr lang="en-US" dirty="0" err="1"/>
+              <a:rPr lang="en-US" err="1"/>
               <a:t>az</a:t>
             </a:r>
             <a:r>
-              <a:rPr lang="en-US" dirty="0"/>
+              <a:rPr lang="en-US"/>
               <a:t> internet </a:t>
             </a:r>
             <a:r>
-              <a:rPr lang="en-US" dirty="0" err="1"/>
+              <a:rPr lang="en-US" err="1"/>
               <a:t>veszélyes</a:t>
             </a:r>
             <a:r>
-              <a:rPr lang="en-US" dirty="0"/>
+              <a:rPr lang="en-US"/>
               <a:t>, de </a:t>
             </a:r>
             <a:r>
-              <a:rPr lang="en-US" dirty="0" err="1"/>
+              <a:rPr lang="en-US" err="1"/>
               <a:t>mégis</a:t>
             </a:r>
             <a:r>
-              <a:rPr lang="en-US" dirty="0"/>
+              <a:rPr lang="en-US"/>
               <a:t> </a:t>
             </a:r>
             <a:r>
-              <a:rPr lang="en-US" dirty="0" err="1"/>
+              <a:rPr lang="en-US" err="1"/>
               <a:t>érdekes</a:t>
             </a:r>
             <a:r>
-              <a:rPr lang="en-US" dirty="0"/>
+              <a:rPr lang="en-US"/>
               <a:t> </a:t>
             </a:r>
             <a:r>
-              <a:rPr lang="en-US" dirty="0" err="1"/>
+              <a:rPr lang="en-US" err="1"/>
               <a:t>hely</a:t>
             </a:r>
             <a:r>
-              <a:rPr lang="en-US" dirty="0"/>
+              <a:rPr lang="en-US"/>
               <a:t>, </a:t>
             </a:r>
             <a:r>
-              <a:rPr lang="en-US" dirty="0" err="1"/>
+              <a:rPr lang="en-US" err="1"/>
               <a:t>ezért</a:t>
             </a:r>
             <a:r>
-              <a:rPr lang="en-US" dirty="0"/>
+              <a:rPr lang="en-US"/>
               <a:t> van </a:t>
             </a:r>
             <a:r>
-              <a:rPr lang="en-US" dirty="0" err="1"/>
+              <a:rPr lang="en-US" err="1"/>
               <a:t>hogy</a:t>
             </a:r>
             <a:r>
-              <a:rPr lang="en-US" dirty="0"/>
+              <a:rPr lang="en-US"/>
               <a:t> </a:t>
             </a:r>
             <a:r>
-              <a:rPr lang="en-US" dirty="0" err="1"/>
+              <a:rPr lang="en-US" err="1"/>
               <a:t>jobb</a:t>
             </a:r>
             <a:r>
-              <a:rPr lang="en-US" dirty="0"/>
+              <a:rPr lang="en-US"/>
               <a:t> </a:t>
             </a:r>
             <a:r>
-              <a:rPr lang="en-US" dirty="0" err="1"/>
+              <a:rPr lang="en-US" err="1"/>
               <a:t>nem</a:t>
             </a:r>
             <a:r>
-              <a:rPr lang="en-US" dirty="0"/>
+              <a:rPr lang="en-US"/>
               <a:t> </a:t>
             </a:r>
             <a:r>
-              <a:rPr lang="en-US" dirty="0" err="1"/>
+              <a:rPr lang="en-US" err="1"/>
               <a:t>kattintani</a:t>
             </a:r>
             <a:r>
-              <a:rPr lang="en-US" dirty="0"/>
+              <a:rPr lang="en-US"/>
               <a:t> </a:t>
             </a:r>
             <a:r>
-              <a:rPr lang="en-US" dirty="0" err="1"/>
+              <a:rPr lang="en-US" err="1"/>
               <a:t>valamire</a:t>
             </a:r>
             <a:r>
-              <a:rPr lang="en-US" dirty="0"/>
+              <a:rPr lang="en-US"/>
               <a:t>, </a:t>
             </a:r>
             <a:r>
-              <a:rPr lang="en-US" dirty="0" err="1"/>
+              <a:rPr lang="en-US" err="1"/>
               <a:t>pedig</a:t>
             </a:r>
             <a:r>
-              <a:rPr lang="en-US" dirty="0"/>
+              <a:rPr lang="en-US"/>
               <a:t>...</a:t>
             </a:r>
           </a:p>
           <a:p>
             <a:r>
-              <a:rPr lang="en-US" dirty="0" err="1"/>
+              <a:rPr lang="en-US" err="1"/>
               <a:t>Hogyan</a:t>
             </a:r>
             <a:r>
-              <a:rPr lang="en-US" dirty="0"/>
+              <a:rPr lang="en-US"/>
               <a:t>?</a:t>
             </a:r>
           </a:p>
           <a:p>
             <a:pPr lvl="1"/>
             <a:r>
-              <a:rPr lang="en-US" dirty="0"/>
+              <a:rPr lang="en-US"/>
               <a:t>Egy </a:t>
             </a:r>
             <a:r>
-              <a:rPr lang="en-US" dirty="0" err="1"/>
+              <a:rPr lang="en-US" err="1"/>
               <a:t>olyan</a:t>
             </a:r>
             <a:r>
-              <a:rPr lang="en-US" dirty="0"/>
+              <a:rPr lang="en-US"/>
               <a:t> </a:t>
             </a:r>
             <a:r>
-              <a:rPr lang="en-US" dirty="0" err="1"/>
+              <a:rPr lang="en-US" err="1"/>
               <a:t>alkalmazással</a:t>
             </a:r>
             <a:r>
-              <a:rPr lang="en-US" dirty="0"/>
+              <a:rPr lang="en-US"/>
               <a:t> </a:t>
             </a:r>
             <a:r>
-              <a:rPr lang="en-US" dirty="0" err="1"/>
+              <a:rPr lang="en-US" err="1"/>
               <a:t>ami</a:t>
             </a:r>
             <a:r>
-              <a:rPr lang="en-US" dirty="0"/>
+              <a:rPr lang="en-US"/>
               <a:t> </a:t>
             </a:r>
             <a:r>
-              <a:rPr lang="en-US" dirty="0" err="1"/>
+              <a:rPr lang="en-US" err="1"/>
               <a:t>könnyen</a:t>
             </a:r>
             <a:r>
-              <a:rPr lang="en-US" dirty="0"/>
+              <a:rPr lang="en-US"/>
               <a:t> </a:t>
             </a:r>
             <a:r>
-              <a:rPr lang="en-US" dirty="0" err="1"/>
+              <a:rPr lang="en-US" err="1"/>
               <a:t>elérhető</a:t>
             </a:r>
             <a:r>
-              <a:rPr lang="en-US" dirty="0"/>
+              <a:rPr lang="en-US"/>
               <a:t> </a:t>
             </a:r>
             <a:r>
-              <a:rPr lang="en-US" dirty="0" err="1"/>
+              <a:rPr lang="en-US" err="1"/>
               <a:t>és</a:t>
             </a:r>
             <a:r>
-              <a:rPr lang="en-US" dirty="0"/>
+              <a:rPr lang="en-US"/>
               <a:t> </a:t>
             </a:r>
             <a:r>
-              <a:rPr lang="en-US" dirty="0" err="1"/>
+              <a:rPr lang="en-US" err="1"/>
               <a:t>helyettünk</a:t>
             </a:r>
             <a:r>
-              <a:rPr lang="en-US" dirty="0"/>
+              <a:rPr lang="en-US"/>
               <a:t> </a:t>
             </a:r>
             <a:r>
-              <a:rPr lang="en-US" dirty="0" err="1"/>
+              <a:rPr lang="en-US" err="1"/>
               <a:t>nézi</a:t>
             </a:r>
             <a:r>
-              <a:rPr lang="en-US" dirty="0"/>
+              <a:rPr lang="en-US"/>
               <a:t> meg </a:t>
             </a:r>
             <a:r>
-              <a:rPr lang="en-US" dirty="0" err="1"/>
+              <a:rPr lang="en-US" err="1"/>
               <a:t>hova</a:t>
             </a:r>
             <a:r>
-              <a:rPr lang="en-US" dirty="0"/>
+              <a:rPr lang="en-US"/>
               <a:t> </a:t>
             </a:r>
             <a:r>
-              <a:rPr lang="en-US" dirty="0" err="1"/>
+              <a:rPr lang="en-US" err="1"/>
               <a:t>mutat</a:t>
             </a:r>
             <a:r>
-              <a:rPr lang="en-US" dirty="0"/>
+              <a:rPr lang="en-US"/>
               <a:t> a link. </a:t>
             </a:r>
           </a:p>
           <a:p>
             <a:pPr lvl="1"/>
-            <a:endParaRPr lang="en-US" dirty="0"/>
+            <a:endParaRPr lang="en-US"/>
           </a:p>
           <a:p>
             <a:pPr lvl="1"/>
-            <a:endParaRPr lang="en-US" dirty="0"/>
+            <a:endParaRPr lang="en-US"/>
           </a:p>
         </p:txBody>
       </p:sp>
@@ -9021,7 +9022,7 @@
               <a:tabLst/>
               <a:defRPr/>
             </a:pPr>
-            <a:endParaRPr kumimoji="0" lang="en-US" sz="1800" b="0" i="0" u="none" strike="noStrike" kern="1200" cap="none" spc="0" normalizeH="0" baseline="0" noProof="0" dirty="0">
+            <a:endParaRPr kumimoji="0" lang="en-US" sz="1800" b="0" i="0" u="none" strike="noStrike" kern="1200" cap="none" spc="0" normalizeH="0" baseline="0" noProof="0">
               <a:ln>
                 <a:noFill/>
               </a:ln>
@@ -9256,7 +9257,7 @@
               <a:tabLst/>
               <a:defRPr/>
             </a:pPr>
-            <a:endParaRPr kumimoji="0" lang="en-US" sz="1800" b="0" i="0" u="none" strike="noStrike" kern="1200" cap="none" spc="0" normalizeH="0" baseline="0" noProof="0" dirty="0">
+            <a:endParaRPr kumimoji="0" lang="en-US" sz="1800" b="0" i="0" u="none" strike="noStrike" kern="1200" cap="none" spc="0" normalizeH="0" baseline="0" noProof="0">
               <a:ln>
                 <a:noFill/>
               </a:ln>
@@ -9610,7 +9611,7 @@
           </a:lstStyle>
           <a:p>
             <a:r>
-              <a:rPr lang="en-US" dirty="0" err="1"/>
+              <a:rPr lang="en-US" err="1"/>
               <a:t>Felépítés</a:t>
             </a:r>
           </a:p>
@@ -9812,7 +9813,7 @@
               <a:buChar char="•"/>
             </a:pPr>
             <a:r>
-              <a:rPr lang="en-US" dirty="0"/>
+              <a:rPr lang="en-US"/>
               <a:t>Logika</a:t>
             </a:r>
           </a:p>
@@ -9821,7 +9822,7 @@
               <a:buChar char="•"/>
             </a:pPr>
             <a:r>
-              <a:rPr lang="en-US" dirty="0" err="1"/>
+              <a:rPr lang="en-US" err="1"/>
               <a:t>URLAnalyser</a:t>
             </a:r>
             <a:endParaRPr lang="en-US"/>
@@ -9831,7 +9832,7 @@
               <a:buChar char="•"/>
             </a:pPr>
             <a:r>
-              <a:rPr lang="en-US" dirty="0"/>
+              <a:rPr lang="en-US"/>
               <a:t>Interface</a:t>
             </a:r>
           </a:p>
@@ -9840,17 +9841,16 @@
               <a:buChar char="•"/>
             </a:pPr>
             <a:r>
-              <a:rPr lang="en-US" dirty="0"/>
+              <a:rPr lang="en-US"/>
               <a:t>Discord</a:t>
             </a:r>
-            <a:endParaRPr lang="en-US"/>
           </a:p>
           <a:p>
             <a:pPr marL="800100" lvl="1" indent="-342900" algn="l">
               <a:buChar char="•"/>
             </a:pPr>
             <a:r>
-              <a:rPr lang="en-US" dirty="0" err="1"/>
+              <a:rPr lang="en-US" err="1"/>
               <a:t>weblap</a:t>
             </a:r>
           </a:p>
@@ -9858,13 +9858,13 @@
             <a:pPr marL="800100" lvl="1" indent="-342900" algn="l">
               <a:buChar char="•"/>
             </a:pPr>
-            <a:endParaRPr lang="en-US" dirty="0"/>
+            <a:endParaRPr lang="en-US"/>
           </a:p>
           <a:p>
             <a:pPr marL="800100" lvl="1" indent="-342900" algn="l">
               <a:buChar char="•"/>
             </a:pPr>
-            <a:endParaRPr lang="en-US" dirty="0"/>
+            <a:endParaRPr lang="en-US"/>
           </a:p>
         </p:txBody>
       </p:sp>
@@ -9920,11 +9920,11 @@
           <a:lstStyle/>
           <a:p>
             <a:r>
-              <a:rPr lang="en-US" dirty="0"/>
+              <a:rPr lang="en-US"/>
               <a:t>Discord </a:t>
             </a:r>
             <a:r>
-              <a:rPr lang="en-US" dirty="0" err="1"/>
+              <a:rPr lang="en-US" err="1"/>
               <a:t>integráció</a:t>
             </a:r>
           </a:p>
@@ -9959,60 +9959,60 @@
           <a:lstStyle/>
           <a:p>
             <a:r>
-              <a:rPr lang="en-US" dirty="0"/>
+              <a:rPr lang="en-US"/>
               <a:t>Mi </a:t>
             </a:r>
             <a:r>
-              <a:rPr lang="en-US" dirty="0" err="1"/>
+              <a:rPr lang="en-US" err="1"/>
               <a:t>az</a:t>
             </a:r>
             <a:r>
-              <a:rPr lang="en-US" dirty="0"/>
+              <a:rPr lang="en-US"/>
               <a:t> a discord?</a:t>
             </a:r>
           </a:p>
           <a:p>
             <a:pPr lvl="1"/>
             <a:r>
-              <a:rPr lang="en-US" dirty="0"/>
+              <a:rPr lang="en-US"/>
               <a:t>A </a:t>
             </a:r>
             <a:r>
-              <a:rPr lang="en-US" dirty="0" err="1"/>
+              <a:rPr lang="en-US" err="1"/>
               <a:t>wikipédia</a:t>
             </a:r>
             <a:r>
-              <a:rPr lang="en-US" dirty="0"/>
+              <a:rPr lang="en-US"/>
               <a:t> </a:t>
             </a:r>
             <a:r>
-              <a:rPr lang="en-US" dirty="0" err="1"/>
+              <a:rPr lang="en-US" err="1"/>
               <a:t>szerint</a:t>
             </a:r>
             <a:r>
-              <a:rPr lang="en-US" dirty="0"/>
+              <a:rPr lang="en-US"/>
               <a:t>: </a:t>
             </a:r>
             <a:r>
-              <a:rPr lang="en-US" i="1" dirty="0"/>
+              <a:rPr lang="en-US" i="1"/>
               <a:t>"</a:t>
             </a:r>
             <a:r>
-              <a:rPr lang="en-US" b="1" i="1" dirty="0">
+              <a:rPr lang="en-US" b="1" i="1">
                 <a:ea typeface="+mn-lt"/>
                 <a:cs typeface="+mn-lt"/>
               </a:rPr>
               <a:t>Discord</a:t>
             </a:r>
             <a:r>
-              <a:rPr lang="en-US" i="1" dirty="0">
+              <a:rPr lang="en-US" i="1">
                 <a:ea typeface="+mn-lt"/>
                 <a:cs typeface="+mn-lt"/>
               </a:rPr>
               <a:t> is a </a:t>
             </a:r>
             <a:r>
-              <a:rPr lang="en-US" i="1" dirty="0">
+              <a:rPr lang="en-US" i="1">
                 <a:ea typeface="+mn-lt"/>
                 <a:cs typeface="+mn-lt"/>
                 <a:hlinkClick r:id="rId2"/>
@@ -10020,14 +10020,14 @@
               <a:t>VoIP</a:t>
             </a:r>
             <a:r>
-              <a:rPr lang="en-US" i="1" dirty="0">
+              <a:rPr lang="en-US" i="1">
                 <a:ea typeface="+mn-lt"/>
                 <a:cs typeface="+mn-lt"/>
               </a:rPr>
               <a:t> and </a:t>
             </a:r>
             <a:r>
-              <a:rPr lang="en-US" i="1" dirty="0">
+              <a:rPr lang="en-US" i="1">
                 <a:ea typeface="+mn-lt"/>
                 <a:cs typeface="+mn-lt"/>
                 <a:hlinkClick r:id="rId3"/>
@@ -10035,14 +10035,14 @@
               <a:t>instant messaging</a:t>
             </a:r>
             <a:r>
-              <a:rPr lang="en-US" i="1" dirty="0">
+              <a:rPr lang="en-US" i="1">
                 <a:ea typeface="+mn-lt"/>
                 <a:cs typeface="+mn-lt"/>
               </a:rPr>
               <a:t> social platform. Users have the ability to communicate with </a:t>
             </a:r>
             <a:r>
-              <a:rPr lang="en-US" i="1" dirty="0">
+              <a:rPr lang="en-US" i="1">
                 <a:ea typeface="+mn-lt"/>
                 <a:cs typeface="+mn-lt"/>
                 <a:hlinkClick r:id="rId2"/>
@@ -10050,14 +10050,14 @@
               <a:t>voice calls</a:t>
             </a:r>
             <a:r>
-              <a:rPr lang="en-US" i="1" dirty="0">
+              <a:rPr lang="en-US" i="1">
                 <a:ea typeface="+mn-lt"/>
                 <a:cs typeface="+mn-lt"/>
               </a:rPr>
               <a:t>, </a:t>
             </a:r>
             <a:r>
-              <a:rPr lang="en-US" i="1" dirty="0">
+              <a:rPr lang="en-US" i="1">
                 <a:ea typeface="+mn-lt"/>
                 <a:cs typeface="+mn-lt"/>
                 <a:hlinkClick r:id="rId4"/>
@@ -10065,14 +10065,14 @@
               <a:t>video calls</a:t>
             </a:r>
             <a:r>
-              <a:rPr lang="en-US" i="1" dirty="0">
+              <a:rPr lang="en-US" i="1">
                 <a:ea typeface="+mn-lt"/>
                 <a:cs typeface="+mn-lt"/>
               </a:rPr>
               <a:t>, </a:t>
             </a:r>
             <a:r>
-              <a:rPr lang="en-US" i="1" dirty="0">
+              <a:rPr lang="en-US" i="1">
                 <a:ea typeface="+mn-lt"/>
                 <a:cs typeface="+mn-lt"/>
                 <a:hlinkClick r:id="rId5"/>
@@ -10080,7 +10080,7 @@
               <a:t>text messaging</a:t>
             </a:r>
             <a:r>
-              <a:rPr lang="en-US" i="1" dirty="0">
+              <a:rPr lang="en-US" i="1">
                 <a:ea typeface="+mn-lt"/>
                 <a:cs typeface="+mn-lt"/>
               </a:rPr>
@@ -10089,132 +10089,132 @@
           </a:p>
           <a:p>
             <a:r>
-              <a:rPr lang="en-US" dirty="0"/>
+              <a:rPr lang="en-US"/>
               <a:t>Mi </a:t>
             </a:r>
             <a:r>
-              <a:rPr lang="en-US" dirty="0" err="1"/>
+              <a:rPr lang="en-US" err="1"/>
               <a:t>az</a:t>
             </a:r>
             <a:r>
-              <a:rPr lang="en-US" dirty="0"/>
+              <a:rPr lang="en-US"/>
               <a:t> a bot?</a:t>
             </a:r>
           </a:p>
           <a:p>
             <a:pPr lvl="1"/>
             <a:r>
-              <a:rPr lang="en-US" dirty="0">
+              <a:rPr lang="en-US">
                 <a:ea typeface="+mn-lt"/>
                 <a:cs typeface="+mn-lt"/>
               </a:rPr>
               <a:t>A bot </a:t>
             </a:r>
             <a:r>
-              <a:rPr lang="en-US" dirty="0" err="1">
+              <a:rPr lang="en-US" err="1">
                 <a:ea typeface="+mn-lt"/>
                 <a:cs typeface="+mn-lt"/>
               </a:rPr>
               <a:t>egy</a:t>
             </a:r>
             <a:r>
-              <a:rPr lang="en-US" dirty="0">
+              <a:rPr lang="en-US">
                 <a:ea typeface="+mn-lt"/>
                 <a:cs typeface="+mn-lt"/>
               </a:rPr>
               <a:t> </a:t>
             </a:r>
             <a:r>
-              <a:rPr lang="en-US" dirty="0" err="1">
+              <a:rPr lang="en-US" err="1">
                 <a:ea typeface="+mn-lt"/>
                 <a:cs typeface="+mn-lt"/>
               </a:rPr>
               <a:t>szoftveralkalmazás</a:t>
             </a:r>
             <a:r>
-              <a:rPr lang="en-US" dirty="0">
+              <a:rPr lang="en-US">
                 <a:ea typeface="+mn-lt"/>
                 <a:cs typeface="+mn-lt"/>
               </a:rPr>
               <a:t>, </a:t>
             </a:r>
             <a:r>
-              <a:rPr lang="en-US" dirty="0" err="1">
+              <a:rPr lang="en-US" err="1">
                 <a:ea typeface="+mn-lt"/>
                 <a:cs typeface="+mn-lt"/>
               </a:rPr>
               <a:t>amely</a:t>
             </a:r>
             <a:r>
-              <a:rPr lang="en-US" dirty="0">
+              <a:rPr lang="en-US">
                 <a:ea typeface="+mn-lt"/>
                 <a:cs typeface="+mn-lt"/>
               </a:rPr>
               <a:t> </a:t>
             </a:r>
             <a:r>
-              <a:rPr lang="en-US" dirty="0" err="1">
+              <a:rPr lang="en-US" err="1">
                 <a:ea typeface="+mn-lt"/>
                 <a:cs typeface="+mn-lt"/>
               </a:rPr>
               <a:t>bizonyos</a:t>
             </a:r>
             <a:r>
-              <a:rPr lang="en-US" dirty="0">
+              <a:rPr lang="en-US">
                 <a:ea typeface="+mn-lt"/>
                 <a:cs typeface="+mn-lt"/>
               </a:rPr>
               <a:t> </a:t>
             </a:r>
             <a:r>
-              <a:rPr lang="en-US" dirty="0" err="1">
+              <a:rPr lang="en-US" err="1">
                 <a:ea typeface="+mn-lt"/>
                 <a:cs typeface="+mn-lt"/>
               </a:rPr>
               <a:t>feladatok</a:t>
             </a:r>
             <a:r>
-              <a:rPr lang="en-US" dirty="0">
+              <a:rPr lang="en-US">
                 <a:ea typeface="+mn-lt"/>
                 <a:cs typeface="+mn-lt"/>
               </a:rPr>
               <a:t> </a:t>
             </a:r>
             <a:r>
-              <a:rPr lang="en-US" dirty="0" err="1">
+              <a:rPr lang="en-US" err="1">
                 <a:ea typeface="+mn-lt"/>
                 <a:cs typeface="+mn-lt"/>
               </a:rPr>
               <a:t>elvégzésére</a:t>
             </a:r>
             <a:r>
-              <a:rPr lang="en-US" dirty="0">
+              <a:rPr lang="en-US">
                 <a:ea typeface="+mn-lt"/>
                 <a:cs typeface="+mn-lt"/>
               </a:rPr>
               <a:t> van </a:t>
             </a:r>
             <a:r>
-              <a:rPr lang="en-US" dirty="0" err="1">
+              <a:rPr lang="en-US" err="1">
                 <a:ea typeface="+mn-lt"/>
                 <a:cs typeface="+mn-lt"/>
               </a:rPr>
               <a:t>programozva</a:t>
             </a:r>
             <a:r>
-              <a:rPr lang="en-US" dirty="0">
+              <a:rPr lang="en-US">
                 <a:ea typeface="+mn-lt"/>
                 <a:cs typeface="+mn-lt"/>
               </a:rPr>
               <a:t>.</a:t>
             </a:r>
-            <a:endParaRPr lang="en-US" dirty="0"/>
+            <a:endParaRPr lang="en-US"/>
           </a:p>
           <a:p>
             <a:pPr marL="457200" lvl="1" indent="0">
               <a:buNone/>
             </a:pPr>
-            <a:endParaRPr lang="en-US" dirty="0"/>
+            <a:endParaRPr lang="en-US"/>
           </a:p>
         </p:txBody>
       </p:sp>
@@ -10561,6 +10561,10 @@
               <a:rPr lang="en-US" dirty="0" err="1"/>
               <a:t>Ingenbot</a:t>
             </a:r>
+            <a:r>
+              <a:rPr lang="en-US" dirty="0"/>
+              <a:t> </a:t>
+            </a:r>
           </a:p>
         </p:txBody>
       </p:sp>
@@ -10715,35 +10719,6 @@
           </a:p>
         </p:txBody>
       </p:sp>
-      <p:pic>
-        <p:nvPicPr>
-          <p:cNvPr id="5" name="Picture 5" descr="Graphical user interface, website&#10;&#10;Description automatically generated">
-            <a:extLst>
-              <a:ext uri="{FF2B5EF4-FFF2-40B4-BE49-F238E27FC236}">
-                <a16:creationId xmlns:a16="http://schemas.microsoft.com/office/drawing/2014/main" id="{B6B34251-F23D-F113-2A67-917DB8C63EB0}"/>
-              </a:ext>
-            </a:extLst>
-          </p:cNvPr>
-          <p:cNvPicPr>
-            <a:picLocks noGrp="1" noChangeAspect="1"/>
-          </p:cNvPicPr>
-          <p:nvPr>
-            <p:ph idx="1"/>
-          </p:nvPr>
-        </p:nvPicPr>
-        <p:blipFill>
-          <a:blip r:embed="rId2"/>
-          <a:stretch>
-            <a:fillRect/>
-          </a:stretch>
-        </p:blipFill>
-        <p:spPr>
-          <a:xfrm>
-            <a:off x="727651" y="1357048"/>
-            <a:ext cx="5667375" cy="5087408"/>
-          </a:xfrm>
-        </p:spPr>
-      </p:pic>
       <p:sp>
         <p:nvSpPr>
           <p:cNvPr id="35" name="Oval 34">
@@ -11305,7 +11280,7 @@
           <p:nvPr/>
         </p:nvPicPr>
         <p:blipFill rotWithShape="1">
-          <a:blip r:embed="rId3"/>
+          <a:blip r:embed="rId2"/>
           <a:srcRect l="21385" r="19365" b="-2"/>
           <a:stretch/>
         </p:blipFill>
@@ -11737,7 +11712,7 @@
               <a:tabLst/>
               <a:defRPr/>
             </a:pPr>
-            <a:endParaRPr kumimoji="0" lang="en-US" sz="1800" b="0" i="0" u="none" strike="noStrike" kern="1200" cap="none" spc="0" normalizeH="0" baseline="0" noProof="0" dirty="0">
+            <a:endParaRPr kumimoji="0" lang="en-US" sz="1800" b="0" i="0" u="none" strike="noStrike" kern="1200" cap="none" spc="0" normalizeH="0" baseline="0" noProof="0">
               <a:ln>
                 <a:noFill/>
               </a:ln>
@@ -11909,6 +11884,82 @@
           </a:p>
         </p:txBody>
       </p:sp>
+      <p:pic>
+        <p:nvPicPr>
+          <p:cNvPr id="7" name="Picture 7" descr="Graphical user interface, text&#10;&#10;Description automatically generated">
+            <a:extLst>
+              <a:ext uri="{FF2B5EF4-FFF2-40B4-BE49-F238E27FC236}">
+                <a16:creationId xmlns:a16="http://schemas.microsoft.com/office/drawing/2014/main" id="{77F56F07-4F08-F120-C2CA-67CB1468170B}"/>
+              </a:ext>
+            </a:extLst>
+          </p:cNvPr>
+          <p:cNvPicPr>
+            <a:picLocks noGrp="1" noChangeAspect="1"/>
+          </p:cNvPicPr>
+          <p:nvPr>
+            <p:ph idx="1"/>
+          </p:nvPr>
+        </p:nvPicPr>
+        <p:blipFill>
+          <a:blip r:embed="rId3"/>
+          <a:stretch>
+            <a:fillRect/>
+          </a:stretch>
+        </p:blipFill>
+        <p:spPr>
+          <a:xfrm>
+            <a:off x="406915" y="1457235"/>
+            <a:ext cx="7266499" cy="4879040"/>
+          </a:xfrm>
+        </p:spPr>
+      </p:pic>
+      <p:sp>
+        <p:nvSpPr>
+          <p:cNvPr id="8" name="TextBox 7">
+            <a:extLst>
+              <a:ext uri="{FF2B5EF4-FFF2-40B4-BE49-F238E27FC236}">
+                <a16:creationId xmlns:a16="http://schemas.microsoft.com/office/drawing/2014/main" id="{E75E69C7-D5EC-0613-8B51-80DFDA34CD9A}"/>
+              </a:ext>
+            </a:extLst>
+          </p:cNvPr>
+          <p:cNvSpPr txBox="1"/>
+          <p:nvPr/>
+        </p:nvSpPr>
+        <p:spPr>
+          <a:xfrm>
+            <a:off x="336467" y="6412674"/>
+            <a:ext cx="3394363" cy="369332"/>
+          </a:xfrm>
+          <a:prstGeom prst="rect">
+            <a:avLst/>
+          </a:prstGeom>
+          <a:noFill/>
+        </p:spPr>
+        <p:txBody>
+          <a:bodyPr rot="0" spcFirstLastPara="0" vertOverflow="overflow" horzOverflow="overflow" vert="horz" wrap="square" lIns="91440" tIns="45720" rIns="91440" bIns="45720" numCol="1" spcCol="0" rtlCol="0" fromWordArt="0" anchor="t" anchorCtr="0" forceAA="0" compatLnSpc="1">
+            <a:prstTxWarp prst="textNoShape">
+              <a:avLst/>
+            </a:prstTxWarp>
+            <a:spAutoFit/>
+          </a:bodyPr>
+          <a:lstStyle/>
+          <a:p>
+            <a:pPr algn="l"/>
+            <a:r>
+              <a:rPr lang="en-US" dirty="0">
+                <a:ea typeface="+mn-lt"/>
+                <a:cs typeface="+mn-lt"/>
+                <a:hlinkClick r:id="rId4"/>
+              </a:rPr>
+              <a:t>https://discord.gg/YzvCf4KA</a:t>
+            </a:r>
+            <a:endParaRPr lang="en-US" dirty="0">
+              <a:ea typeface="+mn-lt"/>
+              <a:cs typeface="+mn-lt"/>
+            </a:endParaRPr>
+          </a:p>
+        </p:txBody>
+      </p:sp>
     </p:spTree>
     <p:extLst>
       <p:ext uri="{BB962C8B-B14F-4D97-AF65-F5344CB8AC3E}">
@@ -11961,37 +12012,107 @@
           <a:lstStyle/>
           <a:p>
             <a:r>
-              <a:rPr lang="en-US" dirty="0" err="1"/>
+              <a:rPr lang="en-US" err="1"/>
               <a:t>Weblap</a:t>
             </a:r>
           </a:p>
         </p:txBody>
       </p:sp>
-      <p:sp>
-        <p:nvSpPr>
-          <p:cNvPr id="3" name="Content Placeholder 2">
+      <p:pic>
+        <p:nvPicPr>
+          <p:cNvPr id="4" name="Picture 4" descr="Graphical user interface, application&#10;&#10;Description automatically generated">
             <a:extLst>
               <a:ext uri="{FF2B5EF4-FFF2-40B4-BE49-F238E27FC236}">
-                <a16:creationId xmlns:a16="http://schemas.microsoft.com/office/drawing/2014/main" id="{C9FEFD8D-0479-A027-A7AD-E55F10B7733D}"/>
+                <a16:creationId xmlns:a16="http://schemas.microsoft.com/office/drawing/2014/main" id="{B1D0C3C2-EBDF-2436-ECF0-ED5139E7662F}"/>
               </a:ext>
             </a:extLst>
           </p:cNvPr>
-          <p:cNvSpPr>
-            <a:spLocks noGrp="1"/>
-          </p:cNvSpPr>
+          <p:cNvPicPr>
+            <a:picLocks noGrp="1" noChangeAspect="1"/>
+          </p:cNvPicPr>
           <p:nvPr>
             <p:ph idx="1"/>
           </p:nvPr>
-        </p:nvSpPr>
-        <p:spPr/>
-        <p:txBody>
-          <a:bodyPr/>
-          <a:lstStyle/>
-          <a:p>
-            <a:endParaRPr lang="en-US"/>
-          </a:p>
-        </p:txBody>
-      </p:sp>
+        </p:nvPicPr>
+        <p:blipFill>
+          <a:blip r:embed="rId2"/>
+          <a:stretch>
+            <a:fillRect/>
+          </a:stretch>
+        </p:blipFill>
+        <p:spPr>
+          <a:xfrm>
+            <a:off x="723173" y="1340716"/>
+            <a:ext cx="3976721" cy="4651431"/>
+          </a:xfrm>
+        </p:spPr>
+      </p:pic>
+      <p:pic>
+        <p:nvPicPr>
+          <p:cNvPr id="5" name="Picture 5" descr="Text&#10;&#10;Description automatically generated">
+            <a:extLst>
+              <a:ext uri="{FF2B5EF4-FFF2-40B4-BE49-F238E27FC236}">
+                <a16:creationId xmlns:a16="http://schemas.microsoft.com/office/drawing/2014/main" id="{8919317E-2A4D-6240-73BE-35CD9AE1CC6F}"/>
+              </a:ext>
+            </a:extLst>
+          </p:cNvPr>
+          <p:cNvPicPr>
+            <a:picLocks noChangeAspect="1"/>
+          </p:cNvPicPr>
+          <p:nvPr/>
+        </p:nvPicPr>
+        <p:blipFill>
+          <a:blip r:embed="rId3"/>
+          <a:stretch>
+            <a:fillRect/>
+          </a:stretch>
+        </p:blipFill>
+        <p:spPr>
+          <a:xfrm>
+            <a:off x="6426531" y="-1068"/>
+            <a:ext cx="5721926" cy="6741380"/>
+          </a:xfrm>
+          <a:prstGeom prst="rect">
+            <a:avLst/>
+          </a:prstGeom>
+        </p:spPr>
+      </p:pic>
+      <p:pic>
+        <p:nvPicPr>
+          <p:cNvPr id="6" name="Graphic 6" descr="A flying arrow">
+            <a:extLst>
+              <a:ext uri="{FF2B5EF4-FFF2-40B4-BE49-F238E27FC236}">
+                <a16:creationId xmlns:a16="http://schemas.microsoft.com/office/drawing/2014/main" id="{753C1A8A-834E-C90A-00A5-1E2E821195B5}"/>
+              </a:ext>
+            </a:extLst>
+          </p:cNvPr>
+          <p:cNvPicPr>
+            <a:picLocks noChangeAspect="1"/>
+          </p:cNvPicPr>
+          <p:nvPr/>
+        </p:nvPicPr>
+        <p:blipFill>
+          <a:blip r:embed="rId4">
+            <a:extLst>
+              <a:ext uri="{96DAC541-7B7A-43D3-8B79-37D633B846F1}">
+                <asvg:svgBlip xmlns:asvg="http://schemas.microsoft.com/office/drawing/2016/SVG/main" r:embed="rId5"/>
+              </a:ext>
+            </a:extLst>
+          </a:blip>
+          <a:stretch>
+            <a:fillRect/>
+          </a:stretch>
+        </p:blipFill>
+        <p:spPr>
+          <a:xfrm>
+            <a:off x="4415517" y="2874324"/>
+            <a:ext cx="1817172" cy="1109353"/>
+          </a:xfrm>
+          <a:prstGeom prst="rect">
+            <a:avLst/>
+          </a:prstGeom>
+        </p:spPr>
+      </p:pic>
     </p:spTree>
     <p:extLst>
       <p:ext uri="{BB962C8B-B14F-4D97-AF65-F5344CB8AC3E}">
@@ -12044,84 +12165,9 @@
           <a:lstStyle/>
           <a:p>
             <a:r>
-              <a:rPr lang="en-US" dirty="0"/>
+              <a:rPr lang="en-US"/>
               <a:t>API</a:t>
             </a:r>
-          </a:p>
-        </p:txBody>
-      </p:sp>
-      <p:sp>
-        <p:nvSpPr>
-          <p:cNvPr id="3" name="Text Placeholder 2">
-            <a:extLst>
-              <a:ext uri="{FF2B5EF4-FFF2-40B4-BE49-F238E27FC236}">
-                <a16:creationId xmlns:a16="http://schemas.microsoft.com/office/drawing/2014/main" id="{1ED1BE11-9703-71F3-5397-C3B435CFA4C6}"/>
-              </a:ext>
-            </a:extLst>
-          </p:cNvPr>
-          <p:cNvSpPr>
-            <a:spLocks noGrp="1"/>
-          </p:cNvSpPr>
-          <p:nvPr>
-            <p:ph type="body" idx="1"/>
-          </p:nvPr>
-        </p:nvSpPr>
-        <p:spPr/>
-        <p:txBody>
-          <a:bodyPr/>
-          <a:lstStyle/>
-          <a:p>
-            <a:endParaRPr lang="en-US"/>
-          </a:p>
-        </p:txBody>
-      </p:sp>
-      <p:sp>
-        <p:nvSpPr>
-          <p:cNvPr id="4" name="Content Placeholder 3">
-            <a:extLst>
-              <a:ext uri="{FF2B5EF4-FFF2-40B4-BE49-F238E27FC236}">
-                <a16:creationId xmlns:a16="http://schemas.microsoft.com/office/drawing/2014/main" id="{C640E801-D5E0-96E8-BEE9-A1CB240B2427}"/>
-              </a:ext>
-            </a:extLst>
-          </p:cNvPr>
-          <p:cNvSpPr>
-            <a:spLocks noGrp="1"/>
-          </p:cNvSpPr>
-          <p:nvPr>
-            <p:ph sz="half" idx="2"/>
-          </p:nvPr>
-        </p:nvSpPr>
-        <p:spPr/>
-        <p:txBody>
-          <a:bodyPr/>
-          <a:lstStyle/>
-          <a:p>
-            <a:endParaRPr lang="en-US"/>
-          </a:p>
-        </p:txBody>
-      </p:sp>
-      <p:sp>
-        <p:nvSpPr>
-          <p:cNvPr id="5" name="Text Placeholder 4">
-            <a:extLst>
-              <a:ext uri="{FF2B5EF4-FFF2-40B4-BE49-F238E27FC236}">
-                <a16:creationId xmlns:a16="http://schemas.microsoft.com/office/drawing/2014/main" id="{AC5D218C-F513-201E-966C-1CA787FE22D6}"/>
-              </a:ext>
-            </a:extLst>
-          </p:cNvPr>
-          <p:cNvSpPr>
-            <a:spLocks noGrp="1"/>
-          </p:cNvSpPr>
-          <p:nvPr>
-            <p:ph type="body" sz="quarter" idx="3"/>
-          </p:nvPr>
-        </p:nvSpPr>
-        <p:spPr/>
-        <p:txBody>
-          <a:bodyPr/>
-          <a:lstStyle/>
-          <a:p>
-            <a:endParaRPr lang="en-US"/>
           </a:p>
         </p:txBody>
       </p:sp>
@@ -12141,15 +12187,776 @@
             <p:ph sz="quarter" idx="4"/>
           </p:nvPr>
         </p:nvSpPr>
-        <p:spPr/>
+        <p:spPr>
+          <a:xfrm>
+            <a:off x="838200" y="1525361"/>
+            <a:ext cx="5183188" cy="3684588"/>
+          </a:xfrm>
+        </p:spPr>
         <p:txBody>
-          <a:bodyPr/>
+          <a:bodyPr vert="horz" lIns="91440" tIns="45720" rIns="91440" bIns="45720" rtlCol="0" anchor="t">
+            <a:normAutofit/>
+          </a:bodyPr>
           <a:lstStyle/>
           <a:p>
-            <a:endParaRPr lang="en-US"/>
+            <a:r>
+              <a:rPr lang="en-US" dirty="0"/>
+              <a:t>Endpoints:</a:t>
+            </a:r>
+          </a:p>
+          <a:p>
+            <a:pPr lvl="1"/>
+            <a:endParaRPr lang="en-US" dirty="0"/>
           </a:p>
         </p:txBody>
       </p:sp>
+      <p:graphicFrame>
+        <p:nvGraphicFramePr>
+          <p:cNvPr id="7" name="Table 7">
+            <a:extLst>
+              <a:ext uri="{FF2B5EF4-FFF2-40B4-BE49-F238E27FC236}">
+                <a16:creationId xmlns:a16="http://schemas.microsoft.com/office/drawing/2014/main" id="{BA568EF7-D694-4A88-38D2-C68AABDE9B3A}"/>
+              </a:ext>
+            </a:extLst>
+          </p:cNvPr>
+          <p:cNvGraphicFramePr>
+            <a:graphicFrameLocks noGrp="1"/>
+          </p:cNvGraphicFramePr>
+          <p:nvPr>
+            <p:extLst>
+              <p:ext uri="{D42A27DB-BD31-4B8C-83A1-F6EECF244321}">
+                <p14:modId xmlns:p14="http://schemas.microsoft.com/office/powerpoint/2010/main" val="2273521614"/>
+              </p:ext>
+            </p:extLst>
+          </p:nvPr>
+        </p:nvGraphicFramePr>
+        <p:xfrm>
+          <a:off x="336467" y="1999012"/>
+          <a:ext cx="11487999" cy="3764280"/>
+        </p:xfrm>
+        <a:graphic>
+          <a:graphicData uri="http://schemas.openxmlformats.org/drawingml/2006/table">
+            <a:tbl>
+              <a:tblPr firstRow="1" bandRow="1">
+                <a:tableStyleId>{21E4AEA4-8DFA-4A89-87EB-49C32662AFE0}</a:tableStyleId>
+              </a:tblPr>
+              <a:tblGrid>
+                <a:gridCol w="1158339">
+                  <a:extLst>
+                    <a:ext uri="{9D8B030D-6E8A-4147-A177-3AD203B41FA5}">
+                      <a16:colId xmlns:a16="http://schemas.microsoft.com/office/drawing/2014/main" val="2433218890"/>
+                    </a:ext>
+                  </a:extLst>
+                </a:gridCol>
+                <a:gridCol w="1701631">
+                  <a:extLst>
+                    <a:ext uri="{9D8B030D-6E8A-4147-A177-3AD203B41FA5}">
+                      <a16:colId xmlns:a16="http://schemas.microsoft.com/office/drawing/2014/main" val="3891155665"/>
+                    </a:ext>
+                  </a:extLst>
+                </a:gridCol>
+                <a:gridCol w="2080909">
+                  <a:extLst>
+                    <a:ext uri="{9D8B030D-6E8A-4147-A177-3AD203B41FA5}">
+                      <a16:colId xmlns:a16="http://schemas.microsoft.com/office/drawing/2014/main" val="2018061750"/>
+                    </a:ext>
+                  </a:extLst>
+                </a:gridCol>
+                <a:gridCol w="2921476">
+                  <a:extLst>
+                    <a:ext uri="{9D8B030D-6E8A-4147-A177-3AD203B41FA5}">
+                      <a16:colId xmlns:a16="http://schemas.microsoft.com/office/drawing/2014/main" val="2534767297"/>
+                    </a:ext>
+                  </a:extLst>
+                </a:gridCol>
+                <a:gridCol w="3625644">
+                  <a:extLst>
+                    <a:ext uri="{9D8B030D-6E8A-4147-A177-3AD203B41FA5}">
+                      <a16:colId xmlns:a16="http://schemas.microsoft.com/office/drawing/2014/main" val="615204689"/>
+                    </a:ext>
+                  </a:extLst>
+                </a:gridCol>
+              </a:tblGrid>
+              <a:tr h="370840">
+                <a:tc>
+                  <a:txBody>
+                    <a:bodyPr/>
+                    <a:lstStyle/>
+                    <a:p>
+                      <a:r>
+                        <a:rPr lang="en-US" dirty="0"/>
+                        <a:t>method</a:t>
+                      </a:r>
+                    </a:p>
+                  </a:txBody>
+                  <a:tcPr/>
+                </a:tc>
+                <a:tc>
+                  <a:txBody>
+                    <a:bodyPr/>
+                    <a:lstStyle/>
+                    <a:p>
+                      <a:r>
+                        <a:rPr lang="en-US" dirty="0"/>
+                        <a:t>path</a:t>
+                      </a:r>
+                    </a:p>
+                  </a:txBody>
+                  <a:tcPr/>
+                </a:tc>
+                <a:tc>
+                  <a:txBody>
+                    <a:bodyPr/>
+                    <a:lstStyle/>
+                    <a:p>
+                      <a:r>
+                        <a:rPr lang="en-US" dirty="0"/>
+                        <a:t>parameters</a:t>
+                      </a:r>
+                    </a:p>
+                  </a:txBody>
+                  <a:tcPr/>
+                </a:tc>
+                <a:tc>
+                  <a:txBody>
+                    <a:bodyPr/>
+                    <a:lstStyle/>
+                    <a:p>
+                      <a:r>
+                        <a:rPr lang="en-US" dirty="0"/>
+                        <a:t>body</a:t>
+                      </a:r>
+                    </a:p>
+                  </a:txBody>
+                  <a:tcPr/>
+                </a:tc>
+                <a:tc>
+                  <a:txBody>
+                    <a:bodyPr/>
+                    <a:lstStyle/>
+                    <a:p>
+                      <a:r>
+                        <a:rPr lang="en-US" dirty="0"/>
+                        <a:t>result</a:t>
+                      </a:r>
+                    </a:p>
+                  </a:txBody>
+                  <a:tcPr/>
+                </a:tc>
+                <a:extLst>
+                  <a:ext uri="{0D108BD9-81ED-4DB2-BD59-A6C34878D82A}">
+                    <a16:rowId xmlns:a16="http://schemas.microsoft.com/office/drawing/2014/main" val="1899333634"/>
+                  </a:ext>
+                </a:extLst>
+              </a:tr>
+              <a:tr h="370840">
+                <a:tc>
+                  <a:txBody>
+                    <a:bodyPr/>
+                    <a:lstStyle/>
+                    <a:p>
+                      <a:r>
+                        <a:rPr lang="en-US" dirty="0"/>
+                        <a:t>GET</a:t>
+                      </a:r>
+                    </a:p>
+                  </a:txBody>
+                  <a:tcPr/>
+                </a:tc>
+                <a:tc>
+                  <a:txBody>
+                    <a:bodyPr/>
+                    <a:lstStyle/>
+                    <a:p>
+                      <a:r>
+                        <a:rPr lang="en-US" dirty="0"/>
+                        <a:t>/</a:t>
+                      </a:r>
+                    </a:p>
+                  </a:txBody>
+                  <a:tcPr/>
+                </a:tc>
+                <a:tc>
+                  <a:txBody>
+                    <a:bodyPr/>
+                    <a:lstStyle/>
+                    <a:p>
+                      <a:r>
+                        <a:rPr lang="en-US" dirty="0"/>
+                        <a:t>-</a:t>
+                      </a:r>
+                    </a:p>
+                  </a:txBody>
+                  <a:tcPr/>
+                </a:tc>
+                <a:tc>
+                  <a:txBody>
+                    <a:bodyPr/>
+                    <a:lstStyle/>
+                    <a:p>
+                      <a:r>
+                        <a:rPr lang="en-US" dirty="0"/>
+                        <a:t>-</a:t>
+                      </a:r>
+                    </a:p>
+                  </a:txBody>
+                  <a:tcPr/>
+                </a:tc>
+                <a:tc>
+                  <a:txBody>
+                    <a:bodyPr/>
+                    <a:lstStyle/>
+                    <a:p>
+                      <a:pPr lvl="0" algn="l">
+                        <a:lnSpc>
+                          <a:spcPct val="100000"/>
+                        </a:lnSpc>
+                        <a:spcBef>
+                          <a:spcPts val="0"/>
+                        </a:spcBef>
+                        <a:spcAft>
+                          <a:spcPts val="0"/>
+                        </a:spcAft>
+                        <a:buNone/>
+                      </a:pPr>
+                      <a:r>
+                        <a:rPr lang="en-US" sz="1800" u="none" strike="noStrike" noProof="0" dirty="0"/>
+                        <a:t>{ "message": "Hallo Welt",</a:t>
+                      </a:r>
+                      <a:endParaRPr lang="en-US" dirty="0"/>
+                    </a:p>
+                    <a:p>
+                      <a:pPr lvl="0" algn="l">
+                        <a:lnSpc>
+                          <a:spcPct val="100000"/>
+                        </a:lnSpc>
+                        <a:spcBef>
+                          <a:spcPts val="0"/>
+                        </a:spcBef>
+                        <a:spcAft>
+                          <a:spcPts val="0"/>
+                        </a:spcAft>
+                        <a:buNone/>
+                      </a:pPr>
+                      <a:r>
+                        <a:rPr lang="en-US" sz="1800" u="none" strike="noStrike" noProof="0" dirty="0"/>
+                        <a:t>"status": 200 }</a:t>
+                      </a:r>
+                      <a:endParaRPr lang="en-US" dirty="0"/>
+                    </a:p>
+                  </a:txBody>
+                  <a:tcPr/>
+                </a:tc>
+                <a:extLst>
+                  <a:ext uri="{0D108BD9-81ED-4DB2-BD59-A6C34878D82A}">
+                    <a16:rowId xmlns:a16="http://schemas.microsoft.com/office/drawing/2014/main" val="536373793"/>
+                  </a:ext>
+                </a:extLst>
+              </a:tr>
+              <a:tr h="370840">
+                <a:tc>
+                  <a:txBody>
+                    <a:bodyPr/>
+                    <a:lstStyle/>
+                    <a:p>
+                      <a:r>
+                        <a:rPr lang="en-US" dirty="0"/>
+                        <a:t>GET</a:t>
+                      </a:r>
+                    </a:p>
+                  </a:txBody>
+                  <a:tcPr/>
+                </a:tc>
+                <a:tc>
+                  <a:txBody>
+                    <a:bodyPr/>
+                    <a:lstStyle/>
+                    <a:p>
+                      <a:r>
+                        <a:rPr lang="en-US" dirty="0"/>
+                        <a:t>/check</a:t>
+                      </a:r>
+                    </a:p>
+                  </a:txBody>
+                  <a:tcPr/>
+                </a:tc>
+                <a:tc>
+                  <a:txBody>
+                    <a:bodyPr/>
+                    <a:lstStyle/>
+                    <a:p>
+                      <a:r>
+                        <a:rPr lang="en-US" dirty="0" err="1"/>
+                        <a:t>url</a:t>
+                      </a:r>
+                    </a:p>
+                  </a:txBody>
+                  <a:tcPr/>
+                </a:tc>
+                <a:tc>
+                  <a:txBody>
+                    <a:bodyPr/>
+                    <a:lstStyle/>
+                    <a:p>
+                      <a:r>
+                        <a:rPr lang="en-US" dirty="0"/>
+                        <a:t>-</a:t>
+                      </a:r>
+                    </a:p>
+                  </a:txBody>
+                  <a:tcPr/>
+                </a:tc>
+                <a:tc>
+                  <a:txBody>
+                    <a:bodyPr/>
+                    <a:lstStyle/>
+                    <a:p>
+                      <a:pPr lvl="0" algn="l">
+                        <a:lnSpc>
+                          <a:spcPct val="100000"/>
+                        </a:lnSpc>
+                        <a:spcBef>
+                          <a:spcPts val="0"/>
+                        </a:spcBef>
+                        <a:spcAft>
+                          <a:spcPts val="0"/>
+                        </a:spcAft>
+                        <a:buNone/>
+                      </a:pPr>
+                      <a:r>
+                        <a:rPr lang="en-US" sz="1800" u="none" strike="noStrike" noProof="0" dirty="0"/>
+                        <a:t>{"result": True / False}</a:t>
+                      </a:r>
+                      <a:endParaRPr lang="en-US" dirty="0"/>
+                    </a:p>
+                  </a:txBody>
+                  <a:tcPr/>
+                </a:tc>
+                <a:extLst>
+                  <a:ext uri="{0D108BD9-81ED-4DB2-BD59-A6C34878D82A}">
+                    <a16:rowId xmlns:a16="http://schemas.microsoft.com/office/drawing/2014/main" val="1385048244"/>
+                  </a:ext>
+                </a:extLst>
+              </a:tr>
+              <a:tr h="370840">
+                <a:tc>
+                  <a:txBody>
+                    <a:bodyPr/>
+                    <a:lstStyle/>
+                    <a:p>
+                      <a:r>
+                        <a:rPr lang="en-US" dirty="0"/>
+                        <a:t>GET</a:t>
+                      </a:r>
+                    </a:p>
+                  </a:txBody>
+                  <a:tcPr/>
+                </a:tc>
+                <a:tc>
+                  <a:txBody>
+                    <a:bodyPr/>
+                    <a:lstStyle/>
+                    <a:p>
+                      <a:r>
+                        <a:rPr lang="en-US" dirty="0"/>
+                        <a:t>/image</a:t>
+                      </a:r>
+                    </a:p>
+                  </a:txBody>
+                  <a:tcPr/>
+                </a:tc>
+                <a:tc>
+                  <a:txBody>
+                    <a:bodyPr/>
+                    <a:lstStyle/>
+                    <a:p>
+                      <a:r>
+                        <a:rPr lang="en-US" dirty="0" err="1"/>
+                        <a:t>url</a:t>
+                      </a:r>
+                    </a:p>
+                  </a:txBody>
+                  <a:tcPr/>
+                </a:tc>
+                <a:tc>
+                  <a:txBody>
+                    <a:bodyPr/>
+                    <a:lstStyle/>
+                    <a:p>
+                      <a:r>
+                        <a:rPr lang="en-US" dirty="0"/>
+                        <a:t>-</a:t>
+                      </a:r>
+                    </a:p>
+                  </a:txBody>
+                  <a:tcPr/>
+                </a:tc>
+                <a:tc>
+                  <a:txBody>
+                    <a:bodyPr/>
+                    <a:lstStyle/>
+                    <a:p>
+                      <a:r>
+                        <a:rPr lang="en-US" dirty="0"/>
+                        <a:t>Screenshot (file)</a:t>
+                      </a:r>
+                    </a:p>
+                  </a:txBody>
+                  <a:tcPr/>
+                </a:tc>
+                <a:extLst>
+                  <a:ext uri="{0D108BD9-81ED-4DB2-BD59-A6C34878D82A}">
+                    <a16:rowId xmlns:a16="http://schemas.microsoft.com/office/drawing/2014/main" val="1155896233"/>
+                  </a:ext>
+                </a:extLst>
+              </a:tr>
+              <a:tr h="370839">
+                <a:tc>
+                  <a:txBody>
+                    <a:bodyPr/>
+                    <a:lstStyle/>
+                    <a:p>
+                      <a:pPr lvl="0">
+                        <a:buNone/>
+                      </a:pPr>
+                      <a:r>
+                        <a:rPr lang="en-US" dirty="0"/>
+                        <a:t>POST</a:t>
+                      </a:r>
+                    </a:p>
+                  </a:txBody>
+                  <a:tcPr/>
+                </a:tc>
+                <a:tc>
+                  <a:txBody>
+                    <a:bodyPr/>
+                    <a:lstStyle/>
+                    <a:p>
+                      <a:pPr lvl="0">
+                        <a:buNone/>
+                      </a:pPr>
+                      <a:r>
+                        <a:rPr lang="en-US" dirty="0"/>
+                        <a:t>/</a:t>
+                      </a:r>
+                      <a:r>
+                        <a:rPr lang="en-US" dirty="0" err="1"/>
+                        <a:t>get_infos</a:t>
+                      </a:r>
+                    </a:p>
+                  </a:txBody>
+                  <a:tcPr/>
+                </a:tc>
+                <a:tc>
+                  <a:txBody>
+                    <a:bodyPr/>
+                    <a:lstStyle/>
+                    <a:p>
+                      <a:pPr lvl="0">
+                        <a:buNone/>
+                      </a:pPr>
+                      <a:r>
+                        <a:rPr lang="en-US" dirty="0"/>
+                        <a:t>-</a:t>
+                      </a:r>
+                    </a:p>
+                  </a:txBody>
+                  <a:tcPr/>
+                </a:tc>
+                <a:tc>
+                  <a:txBody>
+                    <a:bodyPr/>
+                    <a:lstStyle/>
+                    <a:p>
+                      <a:pPr lvl="0" algn="l">
+                        <a:lnSpc>
+                          <a:spcPct val="100000"/>
+                        </a:lnSpc>
+                        <a:spcBef>
+                          <a:spcPts val="0"/>
+                        </a:spcBef>
+                        <a:spcAft>
+                          <a:spcPts val="0"/>
+                        </a:spcAft>
+                        <a:buNone/>
+                      </a:pPr>
+                      <a:r>
+                        <a:rPr lang="en-US" sz="1800" u="none" strike="noStrike" noProof="0" dirty="0"/>
+                        <a:t>{</a:t>
+                      </a:r>
+                      <a:endParaRPr lang="en-US" dirty="0"/>
+                    </a:p>
+                    <a:p>
+                      <a:pPr lvl="0" algn="l">
+                        <a:lnSpc>
+                          <a:spcPct val="100000"/>
+                        </a:lnSpc>
+                        <a:spcBef>
+                          <a:spcPts val="0"/>
+                        </a:spcBef>
+                        <a:spcAft>
+                          <a:spcPts val="0"/>
+                        </a:spcAft>
+                        <a:buNone/>
+                      </a:pPr>
+                      <a:r>
+                        <a:rPr lang="en-US" sz="1800" u="none" strike="noStrike" noProof="0" dirty="0"/>
+                        <a:t>"</a:t>
+                      </a:r>
+                      <a:r>
+                        <a:rPr lang="en-US" sz="1800" u="none" strike="noStrike" noProof="0" dirty="0" err="1"/>
+                        <a:t>url</a:t>
+                      </a:r>
+                      <a:r>
+                        <a:rPr lang="en-US" sz="1800" u="none" strike="noStrike" noProof="0" dirty="0"/>
+                        <a:t>": str</a:t>
+                      </a:r>
+                    </a:p>
+                    <a:p>
+                      <a:pPr lvl="0" algn="l">
+                        <a:lnSpc>
+                          <a:spcPct val="100000"/>
+                        </a:lnSpc>
+                        <a:spcBef>
+                          <a:spcPts val="0"/>
+                        </a:spcBef>
+                        <a:spcAft>
+                          <a:spcPts val="0"/>
+                        </a:spcAft>
+                        <a:buNone/>
+                      </a:pPr>
+                      <a:r>
+                        <a:rPr lang="en-US" sz="1800" u="none" strike="noStrike" noProof="0" dirty="0"/>
+                        <a:t>"</a:t>
+                      </a:r>
+                      <a:r>
+                        <a:rPr lang="en-US" sz="1800" u="none" strike="noStrike" noProof="0" dirty="0" err="1"/>
+                        <a:t>urlhaus</a:t>
+                      </a:r>
+                      <a:r>
+                        <a:rPr lang="en-US" sz="1800" u="none" strike="noStrike" noProof="0" dirty="0"/>
+                        <a:t>": True/False</a:t>
+                      </a:r>
+                      <a:endParaRPr lang="en-US" dirty="0"/>
+                    </a:p>
+                    <a:p>
+                      <a:pPr lvl="0" algn="l">
+                        <a:lnSpc>
+                          <a:spcPct val="100000"/>
+                        </a:lnSpc>
+                        <a:spcBef>
+                          <a:spcPts val="0"/>
+                        </a:spcBef>
+                        <a:spcAft>
+                          <a:spcPts val="0"/>
+                        </a:spcAft>
+                        <a:buNone/>
+                      </a:pPr>
+                      <a:r>
+                        <a:rPr lang="en-US" sz="1800" u="none" strike="noStrike" noProof="0" dirty="0"/>
+                        <a:t>"</a:t>
+                      </a:r>
+                      <a:r>
+                        <a:rPr lang="en-US" sz="1800" u="none" strike="noStrike" noProof="0" dirty="0" err="1"/>
+                        <a:t>virustotal</a:t>
+                      </a:r>
+                      <a:r>
+                        <a:rPr lang="en-US" sz="1800" u="none" strike="noStrike" noProof="0" dirty="0"/>
+                        <a:t>": True/False</a:t>
+                      </a:r>
+                      <a:endParaRPr lang="en-US" dirty="0"/>
+                    </a:p>
+                    <a:p>
+                      <a:pPr lvl="0" algn="l">
+                        <a:lnSpc>
+                          <a:spcPct val="100000"/>
+                        </a:lnSpc>
+                        <a:spcBef>
+                          <a:spcPts val="0"/>
+                        </a:spcBef>
+                        <a:spcAft>
+                          <a:spcPts val="0"/>
+                        </a:spcAft>
+                        <a:buNone/>
+                      </a:pPr>
+                      <a:r>
+                        <a:rPr lang="en-US" sz="1800" u="none" strike="noStrike" noProof="0" dirty="0"/>
+                        <a:t>"</a:t>
+                      </a:r>
+                      <a:r>
+                        <a:rPr lang="en-US" sz="1800" u="none" strike="noStrike" noProof="0" dirty="0" err="1"/>
+                        <a:t>geoip</a:t>
+                      </a:r>
+                      <a:r>
+                        <a:rPr lang="en-US" sz="1800" u="none" strike="noStrike" noProof="0" dirty="0"/>
+                        <a:t>": True/False</a:t>
+                      </a:r>
+                      <a:endParaRPr lang="en-US" dirty="0"/>
+                    </a:p>
+                    <a:p>
+                      <a:pPr lvl="0" algn="l">
+                        <a:lnSpc>
+                          <a:spcPct val="100000"/>
+                        </a:lnSpc>
+                        <a:spcBef>
+                          <a:spcPts val="0"/>
+                        </a:spcBef>
+                        <a:spcAft>
+                          <a:spcPts val="0"/>
+                        </a:spcAft>
+                        <a:buNone/>
+                      </a:pPr>
+                      <a:r>
+                        <a:rPr lang="en-US" sz="1800" u="none" strike="noStrike" noProof="0" dirty="0"/>
+                        <a:t>"history": True/False</a:t>
+                      </a:r>
+                      <a:endParaRPr lang="en-US" dirty="0"/>
+                    </a:p>
+                    <a:p>
+                      <a:pPr lvl="0" algn="l">
+                        <a:lnSpc>
+                          <a:spcPct val="100000"/>
+                        </a:lnSpc>
+                        <a:spcBef>
+                          <a:spcPts val="0"/>
+                        </a:spcBef>
+                        <a:spcAft>
+                          <a:spcPts val="0"/>
+                        </a:spcAft>
+                        <a:buNone/>
+                      </a:pPr>
+                      <a:r>
+                        <a:rPr lang="en-US" sz="1800" u="none" strike="noStrike" noProof="0" dirty="0"/>
+                        <a:t>}</a:t>
+                      </a:r>
+                      <a:endParaRPr lang="en-US" dirty="0"/>
+                    </a:p>
+                  </a:txBody>
+                  <a:tcPr/>
+                </a:tc>
+                <a:tc>
+                  <a:txBody>
+                    <a:bodyPr/>
+                    <a:lstStyle/>
+                    <a:p>
+                      <a:pPr lvl="0" algn="l">
+                        <a:lnSpc>
+                          <a:spcPct val="100000"/>
+                        </a:lnSpc>
+                        <a:spcBef>
+                          <a:spcPts val="0"/>
+                        </a:spcBef>
+                        <a:spcAft>
+                          <a:spcPts val="0"/>
+                        </a:spcAft>
+                        <a:buNone/>
+                      </a:pPr>
+                      <a:r>
+                        <a:rPr lang="en-US" sz="1800" u="none" strike="noStrike" noProof="0" dirty="0"/>
+                        <a:t>{</a:t>
+                      </a:r>
+                    </a:p>
+                    <a:p>
+                      <a:pPr lvl="0" algn="l">
+                        <a:lnSpc>
+                          <a:spcPct val="100000"/>
+                        </a:lnSpc>
+                        <a:spcBef>
+                          <a:spcPts val="0"/>
+                        </a:spcBef>
+                        <a:spcAft>
+                          <a:spcPts val="0"/>
+                        </a:spcAft>
+                        <a:buNone/>
+                      </a:pPr>
+                      <a:r>
+                        <a:rPr lang="en-US" sz="1800" u="none" strike="noStrike" noProof="0" dirty="0"/>
+                        <a:t>"</a:t>
+                      </a:r>
+                      <a:r>
+                        <a:rPr lang="en-US" sz="1800" u="none" strike="noStrike" noProof="0" dirty="0" err="1"/>
+                        <a:t>url</a:t>
+                      </a:r>
+                      <a:r>
+                        <a:rPr lang="en-US" sz="1800" u="none" strike="noStrike" noProof="0" dirty="0"/>
+                        <a:t>": str,</a:t>
+                      </a:r>
+                      <a:endParaRPr lang="en-US" dirty="0"/>
+                    </a:p>
+                    <a:p>
+                      <a:pPr lvl="0" algn="l">
+                        <a:lnSpc>
+                          <a:spcPct val="100000"/>
+                        </a:lnSpc>
+                        <a:spcBef>
+                          <a:spcPts val="0"/>
+                        </a:spcBef>
+                        <a:spcAft>
+                          <a:spcPts val="0"/>
+                        </a:spcAft>
+                        <a:buNone/>
+                      </a:pPr>
+                      <a:r>
+                        <a:rPr lang="en-US" sz="1800" u="none" strike="noStrike" noProof="0" dirty="0"/>
+                        <a:t>"result": </a:t>
+                      </a:r>
+                      <a:r>
+                        <a:rPr lang="en-US" sz="1800" u="none" strike="noStrike" noProof="0" dirty="0" err="1"/>
+                        <a:t>dict</a:t>
+                      </a:r>
+                      <a:r>
+                        <a:rPr lang="en-US" sz="1800" u="none" strike="noStrike" noProof="0" dirty="0"/>
+                        <a:t>,</a:t>
+                      </a:r>
+                      <a:endParaRPr lang="en-US" dirty="0"/>
+                    </a:p>
+                    <a:p>
+                      <a:pPr lvl="0" algn="l">
+                        <a:lnSpc>
+                          <a:spcPct val="100000"/>
+                        </a:lnSpc>
+                        <a:spcBef>
+                          <a:spcPts val="0"/>
+                        </a:spcBef>
+                        <a:spcAft>
+                          <a:spcPts val="0"/>
+                        </a:spcAft>
+                        <a:buNone/>
+                      </a:pPr>
+                      <a:r>
+                        <a:rPr lang="en-US" sz="1800" u="none" strike="noStrike" noProof="0" dirty="0"/>
+                        <a:t>}</a:t>
+                      </a:r>
+                      <a:endParaRPr lang="en-US" dirty="0"/>
+                    </a:p>
+                    <a:p>
+                      <a:pPr lvl="0" algn="l">
+                        <a:lnSpc>
+                          <a:spcPct val="100000"/>
+                        </a:lnSpc>
+                        <a:spcBef>
+                          <a:spcPts val="0"/>
+                        </a:spcBef>
+                        <a:spcAft>
+                          <a:spcPts val="0"/>
+                        </a:spcAft>
+                        <a:buNone/>
+                      </a:pPr>
+                      <a:endParaRPr lang="en-US" sz="1800" u="none" strike="noStrike" noProof="0" dirty="0"/>
+                    </a:p>
+                  </a:txBody>
+                  <a:tcPr/>
+                </a:tc>
+                <a:extLst>
+                  <a:ext uri="{0D108BD9-81ED-4DB2-BD59-A6C34878D82A}">
+                    <a16:rowId xmlns:a16="http://schemas.microsoft.com/office/drawing/2014/main" val="1429643249"/>
+                  </a:ext>
+                </a:extLst>
+              </a:tr>
+            </a:tbl>
+          </a:graphicData>
+        </a:graphic>
+      </p:graphicFrame>
     </p:spTree>
     <p:extLst>
       <p:ext uri="{BB962C8B-B14F-4D97-AF65-F5344CB8AC3E}">
@@ -12383,7 +13190,7 @@
               <a:tabLst/>
               <a:defRPr/>
             </a:pPr>
-            <a:endParaRPr kumimoji="0" lang="en-US" sz="1800" b="0" i="0" u="none" strike="noStrike" kern="1200" cap="none" spc="0" normalizeH="0" baseline="0" noProof="0" dirty="0">
+            <a:endParaRPr kumimoji="0" lang="en-US" sz="1800" b="0" i="0" u="none" strike="noStrike" kern="1200" cap="none" spc="0" normalizeH="0" baseline="0" noProof="0">
               <a:ln>
                 <a:noFill/>
               </a:ln>

</xml_diff>